<commit_message>
Finished presentation and same rounding int .tex file
</commit_message>
<xml_diff>
--- a/final_presentation_1.pptx
+++ b/final_presentation_1.pptx
@@ -6,20 +6,21 @@
     <p:sldMasterId id="2147483721" r:id="rId2"/>
   </p:sldMasterIdLst>
   <p:notesMasterIdLst>
-    <p:notesMasterId r:id="rId11"/>
+    <p:notesMasterId r:id="rId12"/>
   </p:notesMasterIdLst>
   <p:handoutMasterIdLst>
-    <p:handoutMasterId r:id="rId12"/>
+    <p:handoutMasterId r:id="rId13"/>
   </p:handoutMasterIdLst>
   <p:sldIdLst>
     <p:sldId id="403" r:id="rId3"/>
-    <p:sldId id="404" r:id="rId4"/>
+    <p:sldId id="412" r:id="rId4"/>
     <p:sldId id="405" r:id="rId5"/>
     <p:sldId id="406" r:id="rId6"/>
     <p:sldId id="407" r:id="rId7"/>
     <p:sldId id="409" r:id="rId8"/>
     <p:sldId id="410" r:id="rId9"/>
     <p:sldId id="408" r:id="rId10"/>
+    <p:sldId id="411" r:id="rId11"/>
   </p:sldIdLst>
   <p:sldSz cx="17348200" cy="9756775"/>
   <p:notesSz cx="6858000" cy="9144000"/>
@@ -286,7 +287,7 @@
             <a:fld id="{17A39E9D-B438-D94D-AF2A-93757548558C}" type="datetime1">
               <a:rPr lang="nl-NL" altLang="nl-NL"/>
               <a:pPr/>
-              <a:t>11-4-2018</a:t>
+              <a:t>17-4-2018</a:t>
             </a:fld>
             <a:endParaRPr lang="nl-NL" altLang="nl-NL"/>
           </a:p>
@@ -498,7 +499,7 @@
             <a:fld id="{3AA95554-0BC3-EC48-BCE0-DB850053191D}" type="datetime1">
               <a:rPr lang="nl-NL" altLang="nl-NL"/>
               <a:pPr/>
-              <a:t>11-4-2018</a:t>
+              <a:t>17-4-2018</a:t>
             </a:fld>
             <a:endParaRPr lang="nl-NL" altLang="nl-NL"/>
           </a:p>
@@ -1020,7 +1021,7 @@
           <a:p>
             <a:fld id="{9E1ED08B-741D-9E48-95DA-82644AB503BC}" type="datetime1">
               <a:rPr lang="nl-NL" altLang="nl-NL" smtClean="0"/>
-              <a:t>11-4-2018</a:t>
+              <a:t>17-4-2018</a:t>
             </a:fld>
             <a:endParaRPr lang="nl-NL" altLang="nl-NL"/>
           </a:p>
@@ -1354,7 +1355,7 @@
             <a:fld id="{9E1ED08B-741D-9E48-95DA-82644AB503BC}" type="datetime1">
               <a:rPr lang="nl-NL" altLang="nl-NL" smtClean="0"/>
               <a:pPr/>
-              <a:t>11-4-2018</a:t>
+              <a:t>17-4-2018</a:t>
             </a:fld>
             <a:endParaRPr lang="nl-NL" altLang="nl-NL" dirty="0"/>
           </a:p>
@@ -1583,7 +1584,7 @@
           <a:p>
             <a:fld id="{46CB0545-8C00-A544-A88F-C33FBC7A7630}" type="datetime1">
               <a:rPr lang="nl-NL" altLang="nl-NL" smtClean="0"/>
-              <a:t>11-4-2018</a:t>
+              <a:t>17-4-2018</a:t>
             </a:fld>
             <a:endParaRPr lang="nl-NL" altLang="nl-NL" dirty="0"/>
           </a:p>
@@ -1940,7 +1941,7 @@
           <a:p>
             <a:fld id="{46CB0545-8C00-A544-A88F-C33FBC7A7630}" type="datetime1">
               <a:rPr lang="nl-NL" altLang="nl-NL" smtClean="0"/>
-              <a:t>11-4-2018</a:t>
+              <a:t>17-4-2018</a:t>
             </a:fld>
             <a:endParaRPr lang="nl-NL" altLang="nl-NL" dirty="0"/>
           </a:p>
@@ -2399,7 +2400,7 @@
             <a:fld id="{B3873A8C-A209-FC40-86BC-D3E9A671FD81}" type="datetime1">
               <a:rPr lang="nl-NL" altLang="nl-NL" smtClean="0"/>
               <a:pPr/>
-              <a:t>11-4-2018</a:t>
+              <a:t>17-4-2018</a:t>
             </a:fld>
             <a:endParaRPr lang="nl-NL" altLang="nl-NL" dirty="0"/>
           </a:p>
@@ -3132,7 +3133,7 @@
             <a:fld id="{FB5CF2AB-20FF-5442-9E53-3C6EDD7FBCEA}" type="datetime1">
               <a:rPr lang="nl-NL" altLang="nl-NL" smtClean="0"/>
               <a:pPr/>
-              <a:t>11-4-2018</a:t>
+              <a:t>17-4-2018</a:t>
             </a:fld>
             <a:endParaRPr lang="nl-NL" altLang="nl-NL" dirty="0"/>
           </a:p>
@@ -3643,7 +3644,13 @@
       </p:grpSpPr>
       <p:sp>
         <p:nvSpPr>
-          <p:cNvPr id="4" name="Titel 3"/>
+          <p:cNvPr id="2" name="Title 1">
+            <a:extLst>
+              <a:ext uri="{FF2B5EF4-FFF2-40B4-BE49-F238E27FC236}">
+                <a16:creationId xmlns:a16="http://schemas.microsoft.com/office/drawing/2014/main" id="{89314897-1D3C-47B4-9234-C284ED0743A4}"/>
+              </a:ext>
+            </a:extLst>
+          </p:cNvPr>
           <p:cNvSpPr>
             <a:spLocks noGrp="1"/>
           </p:cNvSpPr>
@@ -3657,15 +3664,22 @@
           <a:lstStyle/>
           <a:p>
             <a:r>
-              <a:rPr lang="nl-NL" dirty="0"/>
+              <a:rPr lang="en-GB" dirty="0"/>
               <a:t>Outline</a:t>
             </a:r>
+            <a:endParaRPr lang="en-NL" dirty="0"/>
           </a:p>
         </p:txBody>
       </p:sp>
       <p:sp>
         <p:nvSpPr>
-          <p:cNvPr id="5" name="Tijdelijke aanduiding voor inhoud 4"/>
+          <p:cNvPr id="3" name="Content Placeholder 2">
+            <a:extLst>
+              <a:ext uri="{FF2B5EF4-FFF2-40B4-BE49-F238E27FC236}">
+                <a16:creationId xmlns:a16="http://schemas.microsoft.com/office/drawing/2014/main" id="{D3964BCA-D38E-4090-8D40-2C148B41D856}"/>
+              </a:ext>
+            </a:extLst>
+          </p:cNvPr>
           <p:cNvSpPr>
             <a:spLocks noGrp="1"/>
           </p:cNvSpPr>
@@ -3707,12 +3721,15 @@
               <a:t>Discussion</a:t>
             </a:r>
           </a:p>
+          <a:p>
+            <a:endParaRPr lang="en-NL" dirty="0"/>
+          </a:p>
         </p:txBody>
       </p:sp>
     </p:spTree>
     <p:extLst>
       <p:ext uri="{BB962C8B-B14F-4D97-AF65-F5344CB8AC3E}">
-        <p14:creationId xmlns:p14="http://schemas.microsoft.com/office/powerpoint/2010/main" val="1497031764"/>
+        <p14:creationId xmlns:p14="http://schemas.microsoft.com/office/powerpoint/2010/main" val="4141976644"/>
       </p:ext>
     </p:extLst>
   </p:cSld>
@@ -4330,13 +4347,6 @@
               <a:t>Bi-directional LSTM</a:t>
             </a:r>
           </a:p>
-          <a:p>
-            <a:r>
-              <a:rPr lang="en-GB" dirty="0"/>
-              <a:t>Ensemble</a:t>
-            </a:r>
-            <a:endParaRPr lang="en-NL" dirty="0"/>
-          </a:p>
         </p:txBody>
       </p:sp>
     </p:spTree>
@@ -4420,7 +4430,7 @@
         <p:spPr/>
         <p:txBody>
           <a:bodyPr>
-            <a:normAutofit lnSpcReduction="10000"/>
+            <a:normAutofit fontScale="92500" lnSpcReduction="10000"/>
           </a:bodyPr>
           <a:lstStyle/>
           <a:p>
@@ -4468,6 +4478,21 @@
             <a:r>
               <a:rPr lang="en-GB" dirty="0"/>
               <a:t>Expanding feature set</a:t>
+            </a:r>
+          </a:p>
+          <a:p>
+            <a:pPr lvl="1"/>
+            <a:r>
+              <a:rPr lang="en-GB" dirty="0"/>
+              <a:t>Swear words, word2vec </a:t>
+            </a:r>
+            <a:r>
+              <a:rPr lang="en-GB" dirty="0" err="1"/>
+              <a:t>tf-idf</a:t>
+            </a:r>
+            <a:r>
+              <a:rPr lang="en-GB" dirty="0"/>
+              <a:t> scores</a:t>
             </a:r>
           </a:p>
           <a:p>
@@ -4732,18 +4757,14 @@
           <a:bodyPr/>
           <a:lstStyle/>
           <a:p>
-            <a:r>
-              <a:rPr lang="en-GB" dirty="0"/>
-              <a:t>Results per model </a:t>
-            </a:r>
-            <a:r>
-              <a:rPr lang="en-GB" dirty="0">
-                <a:solidFill>
-                  <a:srgbClr val="FF0000"/>
-                </a:solidFill>
-              </a:rPr>
-              <a:t>TABEL</a:t>
-            </a:r>
+            <a:pPr marL="0" indent="0">
+              <a:buNone/>
+            </a:pPr>
+            <a:endParaRPr lang="en-GB" dirty="0">
+              <a:solidFill>
+                <a:srgbClr val="FF0000"/>
+              </a:solidFill>
+            </a:endParaRPr>
           </a:p>
           <a:p>
             <a:endParaRPr lang="en-GB" dirty="0"/>
@@ -4775,20 +4796,144 @@
               <a:t>Kaggle final place : </a:t>
             </a:r>
             <a:r>
-              <a:rPr lang="en-GB" dirty="0">
-                <a:solidFill>
-                  <a:srgbClr val="FF0000"/>
-                </a:solidFill>
-              </a:rPr>
-              <a:t>INVULLEN</a:t>
-            </a:r>
+              <a:rPr lang="en-GB" b="1" i="1" dirty="0"/>
+              <a:t>4090</a:t>
+            </a:r>
+          </a:p>
+        </p:txBody>
+      </p:sp>
+      <p:pic>
+        <p:nvPicPr>
+          <p:cNvPr id="7" name="Picture 6">
+            <a:extLst>
+              <a:ext uri="{FF2B5EF4-FFF2-40B4-BE49-F238E27FC236}">
+                <a16:creationId xmlns:a16="http://schemas.microsoft.com/office/drawing/2014/main" id="{EBF51D3D-15E4-4542-8545-C404D9B5A90F}"/>
+              </a:ext>
+            </a:extLst>
+          </p:cNvPr>
+          <p:cNvPicPr>
+            <a:picLocks noChangeAspect="1"/>
+          </p:cNvPicPr>
+          <p:nvPr/>
+        </p:nvPicPr>
+        <p:blipFill>
+          <a:blip r:embed="rId2"/>
+          <a:stretch>
+            <a:fillRect/>
+          </a:stretch>
+        </p:blipFill>
+        <p:spPr>
+          <a:xfrm>
+            <a:off x="3594971" y="2071389"/>
+            <a:ext cx="9426208" cy="4472179"/>
+          </a:xfrm>
+          <a:prstGeom prst="rect">
+            <a:avLst/>
+          </a:prstGeom>
+        </p:spPr>
+      </p:pic>
+    </p:spTree>
+    <p:extLst>
+      <p:ext uri="{BB962C8B-B14F-4D97-AF65-F5344CB8AC3E}">
+        <p14:creationId xmlns:p14="http://schemas.microsoft.com/office/powerpoint/2010/main" val="763118794"/>
+      </p:ext>
+    </p:extLst>
+  </p:cSld>
+  <p:clrMapOvr>
+    <a:masterClrMapping/>
+  </p:clrMapOvr>
+  <p:transition spd="med">
+    <p:fade/>
+  </p:transition>
+</p:sld>
+</file>
+
+<file path=ppt/slides/slide9.xml><?xml version="1.0" encoding="utf-8"?>
+<p:sld xmlns:a="http://schemas.openxmlformats.org/drawingml/2006/main" xmlns:r="http://schemas.openxmlformats.org/officeDocument/2006/relationships" xmlns:p="http://schemas.openxmlformats.org/presentationml/2006/main">
+  <p:cSld>
+    <p:spTree>
+      <p:nvGrpSpPr>
+        <p:cNvPr id="1" name=""/>
+        <p:cNvGrpSpPr/>
+        <p:nvPr/>
+      </p:nvGrpSpPr>
+      <p:grpSpPr>
+        <a:xfrm>
+          <a:off x="0" y="0"/>
+          <a:ext cx="0" cy="0"/>
+          <a:chOff x="0" y="0"/>
+          <a:chExt cx="0" cy="0"/>
+        </a:xfrm>
+      </p:grpSpPr>
+      <p:sp>
+        <p:nvSpPr>
+          <p:cNvPr id="2" name="Title 1">
+            <a:extLst>
+              <a:ext uri="{FF2B5EF4-FFF2-40B4-BE49-F238E27FC236}">
+                <a16:creationId xmlns:a16="http://schemas.microsoft.com/office/drawing/2014/main" id="{131C3323-D3A4-4890-9C04-102267386823}"/>
+              </a:ext>
+            </a:extLst>
+          </p:cNvPr>
+          <p:cNvSpPr>
+            <a:spLocks noGrp="1"/>
+          </p:cNvSpPr>
+          <p:nvPr>
+            <p:ph type="title"/>
+          </p:nvPr>
+        </p:nvSpPr>
+        <p:spPr/>
+        <p:txBody>
+          <a:bodyPr/>
+          <a:lstStyle/>
+          <a:p>
+            <a:r>
+              <a:rPr lang="en-GB" dirty="0"/>
+              <a:t>Looking forward</a:t>
+            </a:r>
+            <a:endParaRPr lang="en-NL" dirty="0"/>
+          </a:p>
+        </p:txBody>
+      </p:sp>
+      <p:sp>
+        <p:nvSpPr>
+          <p:cNvPr id="3" name="Content Placeholder 2">
+            <a:extLst>
+              <a:ext uri="{FF2B5EF4-FFF2-40B4-BE49-F238E27FC236}">
+                <a16:creationId xmlns:a16="http://schemas.microsoft.com/office/drawing/2014/main" id="{8CA7B8CE-A3D1-4412-9521-88C03A280491}"/>
+              </a:ext>
+            </a:extLst>
+          </p:cNvPr>
+          <p:cNvSpPr>
+            <a:spLocks noGrp="1"/>
+          </p:cNvSpPr>
+          <p:nvPr>
+            <p:ph idx="1"/>
+          </p:nvPr>
+        </p:nvSpPr>
+        <p:spPr/>
+        <p:txBody>
+          <a:bodyPr/>
+          <a:lstStyle/>
+          <a:p>
+            <a:r>
+              <a:rPr lang="en-GB"/>
+              <a:t>Pre-processing</a:t>
+            </a:r>
+            <a:endParaRPr lang="en-GB" dirty="0"/>
+          </a:p>
+          <a:p>
+            <a:r>
+              <a:rPr lang="en-GB" dirty="0"/>
+              <a:t>Ensemble</a:t>
+            </a:r>
+            <a:endParaRPr lang="en-NL" dirty="0"/>
           </a:p>
         </p:txBody>
       </p:sp>
     </p:spTree>
     <p:extLst>
       <p:ext uri="{BB962C8B-B14F-4D97-AF65-F5344CB8AC3E}">
-        <p14:creationId xmlns:p14="http://schemas.microsoft.com/office/powerpoint/2010/main" val="763118794"/>
+        <p14:creationId xmlns:p14="http://schemas.microsoft.com/office/powerpoint/2010/main" val="506918540"/>
       </p:ext>
     </p:extLst>
   </p:cSld>

</xml_diff>